<commit_message>
final edits for pptx
</commit_message>
<xml_diff>
--- a/Presentation_4.pptx
+++ b/Presentation_4.pptx
@@ -4,23 +4,27 @@
   <p:sldMasterIdLst>
     <p:sldMasterId id="2147483660" r:id="rId4"/>
   </p:sldMasterIdLst>
+  <p:notesMasterIdLst>
+    <p:notesMasterId r:id="rId22"/>
+  </p:notesMasterIdLst>
   <p:sldIdLst>
     <p:sldId id="280" r:id="rId5"/>
     <p:sldId id="291" r:id="rId6"/>
     <p:sldId id="293" r:id="rId7"/>
-    <p:sldId id="294" r:id="rId8"/>
-    <p:sldId id="295" r:id="rId9"/>
-    <p:sldId id="296" r:id="rId10"/>
-    <p:sldId id="297" r:id="rId11"/>
-    <p:sldId id="304" r:id="rId12"/>
-    <p:sldId id="286" r:id="rId13"/>
-    <p:sldId id="299" r:id="rId14"/>
-    <p:sldId id="300" r:id="rId15"/>
-    <p:sldId id="301" r:id="rId16"/>
-    <p:sldId id="302" r:id="rId17"/>
-    <p:sldId id="303" r:id="rId18"/>
-    <p:sldId id="298" r:id="rId19"/>
-    <p:sldId id="288" r:id="rId20"/>
+    <p:sldId id="305" r:id="rId8"/>
+    <p:sldId id="306" r:id="rId9"/>
+    <p:sldId id="295" r:id="rId10"/>
+    <p:sldId id="296" r:id="rId11"/>
+    <p:sldId id="297" r:id="rId12"/>
+    <p:sldId id="304" r:id="rId13"/>
+    <p:sldId id="286" r:id="rId14"/>
+    <p:sldId id="299" r:id="rId15"/>
+    <p:sldId id="300" r:id="rId16"/>
+    <p:sldId id="301" r:id="rId17"/>
+    <p:sldId id="302" r:id="rId18"/>
+    <p:sldId id="303" r:id="rId19"/>
+    <p:sldId id="298" r:id="rId20"/>
+    <p:sldId id="288" r:id="rId21"/>
   </p:sldIdLst>
   <p:sldSz cx="12192000" cy="6858000"/>
   <p:notesSz cx="6858000" cy="9144000"/>
@@ -127,6 +131,523 @@
 </p:presentation>
 </file>
 
+<file path=ppt/notesMasters/notesMaster1.xml><?xml version="1.0" encoding="utf-8"?>
+<p:notesMaster xmlns:a="http://schemas.openxmlformats.org/drawingml/2006/main" xmlns:r="http://schemas.openxmlformats.org/officeDocument/2006/relationships" xmlns:p="http://schemas.openxmlformats.org/presentationml/2006/main">
+  <p:cSld>
+    <p:bg>
+      <p:bgRef idx="1001">
+        <a:schemeClr val="bg1"/>
+      </p:bgRef>
+    </p:bg>
+    <p:spTree>
+      <p:nvGrpSpPr>
+        <p:cNvPr id="1" name=""/>
+        <p:cNvGrpSpPr/>
+        <p:nvPr/>
+      </p:nvGrpSpPr>
+      <p:grpSpPr>
+        <a:xfrm>
+          <a:off x="0" y="0"/>
+          <a:ext cx="0" cy="0"/>
+          <a:chOff x="0" y="0"/>
+          <a:chExt cx="0" cy="0"/>
+        </a:xfrm>
+      </p:grpSpPr>
+      <p:sp>
+        <p:nvSpPr>
+          <p:cNvPr id="2" name="Header Placeholder 1"/>
+          <p:cNvSpPr>
+            <a:spLocks noGrp="1"/>
+          </p:cNvSpPr>
+          <p:nvPr>
+            <p:ph type="hdr" sz="quarter"/>
+          </p:nvPr>
+        </p:nvSpPr>
+        <p:spPr>
+          <a:xfrm>
+            <a:off x="0" y="0"/>
+            <a:ext cx="2971800" cy="458788"/>
+          </a:xfrm>
+          <a:prstGeom prst="rect">
+            <a:avLst/>
+          </a:prstGeom>
+        </p:spPr>
+        <p:txBody>
+          <a:bodyPr vert="horz" lIns="91440" tIns="45720" rIns="91440" bIns="45720" rtlCol="0"/>
+          <a:lstStyle>
+            <a:lvl1pPr algn="l">
+              <a:defRPr sz="1200"/>
+            </a:lvl1pPr>
+          </a:lstStyle>
+          <a:p>
+            <a:endParaRPr lang="en-US"/>
+          </a:p>
+        </p:txBody>
+      </p:sp>
+      <p:sp>
+        <p:nvSpPr>
+          <p:cNvPr id="3" name="Date Placeholder 2"/>
+          <p:cNvSpPr>
+            <a:spLocks noGrp="1"/>
+          </p:cNvSpPr>
+          <p:nvPr>
+            <p:ph type="dt" idx="1"/>
+          </p:nvPr>
+        </p:nvSpPr>
+        <p:spPr>
+          <a:xfrm>
+            <a:off x="3884613" y="0"/>
+            <a:ext cx="2971800" cy="458788"/>
+          </a:xfrm>
+          <a:prstGeom prst="rect">
+            <a:avLst/>
+          </a:prstGeom>
+        </p:spPr>
+        <p:txBody>
+          <a:bodyPr vert="horz" lIns="91440" tIns="45720" rIns="91440" bIns="45720" rtlCol="0"/>
+          <a:lstStyle>
+            <a:lvl1pPr algn="r">
+              <a:defRPr sz="1200"/>
+            </a:lvl1pPr>
+          </a:lstStyle>
+          <a:p>
+            <a:fld id="{7C71CD7E-C729-7940-B65F-84DDF1F4C7CE}" type="datetimeFigureOut">
+              <a:rPr lang="en-US" smtClean="0"/>
+              <a:t>1/2/25</a:t>
+            </a:fld>
+            <a:endParaRPr lang="en-US"/>
+          </a:p>
+        </p:txBody>
+      </p:sp>
+      <p:sp>
+        <p:nvSpPr>
+          <p:cNvPr id="4" name="Slide Image Placeholder 3"/>
+          <p:cNvSpPr>
+            <a:spLocks noGrp="1" noRot="1" noChangeAspect="1"/>
+          </p:cNvSpPr>
+          <p:nvPr>
+            <p:ph type="sldImg" idx="2"/>
+          </p:nvPr>
+        </p:nvSpPr>
+        <p:spPr>
+          <a:xfrm>
+            <a:off x="685800" y="1143000"/>
+            <a:ext cx="5486400" cy="3086100"/>
+          </a:xfrm>
+          <a:prstGeom prst="rect">
+            <a:avLst/>
+          </a:prstGeom>
+          <a:noFill/>
+          <a:ln w="12700">
+            <a:solidFill>
+              <a:prstClr val="black"/>
+            </a:solidFill>
+          </a:ln>
+        </p:spPr>
+        <p:txBody>
+          <a:bodyPr vert="horz" lIns="91440" tIns="45720" rIns="91440" bIns="45720" rtlCol="0" anchor="ctr"/>
+          <a:lstStyle/>
+          <a:p>
+            <a:endParaRPr lang="en-US"/>
+          </a:p>
+        </p:txBody>
+      </p:sp>
+      <p:sp>
+        <p:nvSpPr>
+          <p:cNvPr id="5" name="Notes Placeholder 4"/>
+          <p:cNvSpPr>
+            <a:spLocks noGrp="1"/>
+          </p:cNvSpPr>
+          <p:nvPr>
+            <p:ph type="body" sz="quarter" idx="3"/>
+          </p:nvPr>
+        </p:nvSpPr>
+        <p:spPr>
+          <a:xfrm>
+            <a:off x="685800" y="4400550"/>
+            <a:ext cx="5486400" cy="3600450"/>
+          </a:xfrm>
+          <a:prstGeom prst="rect">
+            <a:avLst/>
+          </a:prstGeom>
+        </p:spPr>
+        <p:txBody>
+          <a:bodyPr vert="horz" lIns="91440" tIns="45720" rIns="91440" bIns="45720" rtlCol="0"/>
+          <a:lstStyle/>
+          <a:p>
+            <a:pPr lvl="0"/>
+            <a:r>
+              <a:rPr lang="en-US"/>
+              <a:t>Click to edit Master text styles</a:t>
+            </a:r>
+          </a:p>
+          <a:p>
+            <a:pPr lvl="1"/>
+            <a:r>
+              <a:rPr lang="en-US"/>
+              <a:t>Second level</a:t>
+            </a:r>
+          </a:p>
+          <a:p>
+            <a:pPr lvl="2"/>
+            <a:r>
+              <a:rPr lang="en-US"/>
+              <a:t>Third level</a:t>
+            </a:r>
+          </a:p>
+          <a:p>
+            <a:pPr lvl="3"/>
+            <a:r>
+              <a:rPr lang="en-US"/>
+              <a:t>Fourth level</a:t>
+            </a:r>
+          </a:p>
+          <a:p>
+            <a:pPr lvl="4"/>
+            <a:r>
+              <a:rPr lang="en-US"/>
+              <a:t>Fifth level</a:t>
+            </a:r>
+          </a:p>
+        </p:txBody>
+      </p:sp>
+      <p:sp>
+        <p:nvSpPr>
+          <p:cNvPr id="6" name="Footer Placeholder 5"/>
+          <p:cNvSpPr>
+            <a:spLocks noGrp="1"/>
+          </p:cNvSpPr>
+          <p:nvPr>
+            <p:ph type="ftr" sz="quarter" idx="4"/>
+          </p:nvPr>
+        </p:nvSpPr>
+        <p:spPr>
+          <a:xfrm>
+            <a:off x="0" y="8685213"/>
+            <a:ext cx="2971800" cy="458787"/>
+          </a:xfrm>
+          <a:prstGeom prst="rect">
+            <a:avLst/>
+          </a:prstGeom>
+        </p:spPr>
+        <p:txBody>
+          <a:bodyPr vert="horz" lIns="91440" tIns="45720" rIns="91440" bIns="45720" rtlCol="0" anchor="b"/>
+          <a:lstStyle>
+            <a:lvl1pPr algn="l">
+              <a:defRPr sz="1200"/>
+            </a:lvl1pPr>
+          </a:lstStyle>
+          <a:p>
+            <a:endParaRPr lang="en-US"/>
+          </a:p>
+        </p:txBody>
+      </p:sp>
+      <p:sp>
+        <p:nvSpPr>
+          <p:cNvPr id="7" name="Slide Number Placeholder 6"/>
+          <p:cNvSpPr>
+            <a:spLocks noGrp="1"/>
+          </p:cNvSpPr>
+          <p:nvPr>
+            <p:ph type="sldNum" sz="quarter" idx="5"/>
+          </p:nvPr>
+        </p:nvSpPr>
+        <p:spPr>
+          <a:xfrm>
+            <a:off x="3884613" y="8685213"/>
+            <a:ext cx="2971800" cy="458787"/>
+          </a:xfrm>
+          <a:prstGeom prst="rect">
+            <a:avLst/>
+          </a:prstGeom>
+        </p:spPr>
+        <p:txBody>
+          <a:bodyPr vert="horz" lIns="91440" tIns="45720" rIns="91440" bIns="45720" rtlCol="0" anchor="b"/>
+          <a:lstStyle>
+            <a:lvl1pPr algn="r">
+              <a:defRPr sz="1200"/>
+            </a:lvl1pPr>
+          </a:lstStyle>
+          <a:p>
+            <a:fld id="{D86CBE04-A588-EE4F-9F7A-8067FB9DBC1C}" type="slidenum">
+              <a:rPr lang="en-US" smtClean="0"/>
+              <a:t>‹#›</a:t>
+            </a:fld>
+            <a:endParaRPr lang="en-US"/>
+          </a:p>
+        </p:txBody>
+      </p:sp>
+    </p:spTree>
+    <p:extLst>
+      <p:ext uri="{BB962C8B-B14F-4D97-AF65-F5344CB8AC3E}">
+        <p14:creationId xmlns:p14="http://schemas.microsoft.com/office/powerpoint/2010/main" val="2453443986"/>
+      </p:ext>
+    </p:extLst>
+  </p:cSld>
+  <p:clrMap bg1="lt1" tx1="dk1" bg2="lt2" tx2="dk2" accent1="accent1" accent2="accent2" accent3="accent3" accent4="accent4" accent5="accent5" accent6="accent6" hlink="hlink" folHlink="folHlink"/>
+  <p:notesStyle>
+    <a:lvl1pPr marL="0" algn="l" defTabSz="914400" rtl="0" eaLnBrk="1" latinLnBrk="0" hangingPunct="1">
+      <a:defRPr sz="1200" kern="1200">
+        <a:solidFill>
+          <a:schemeClr val="tx1"/>
+        </a:solidFill>
+        <a:latin typeface="+mn-lt"/>
+        <a:ea typeface="+mn-ea"/>
+        <a:cs typeface="+mn-cs"/>
+      </a:defRPr>
+    </a:lvl1pPr>
+    <a:lvl2pPr marL="457200" algn="l" defTabSz="914400" rtl="0" eaLnBrk="1" latinLnBrk="0" hangingPunct="1">
+      <a:defRPr sz="1200" kern="1200">
+        <a:solidFill>
+          <a:schemeClr val="tx1"/>
+        </a:solidFill>
+        <a:latin typeface="+mn-lt"/>
+        <a:ea typeface="+mn-ea"/>
+        <a:cs typeface="+mn-cs"/>
+      </a:defRPr>
+    </a:lvl2pPr>
+    <a:lvl3pPr marL="914400" algn="l" defTabSz="914400" rtl="0" eaLnBrk="1" latinLnBrk="0" hangingPunct="1">
+      <a:defRPr sz="1200" kern="1200">
+        <a:solidFill>
+          <a:schemeClr val="tx1"/>
+        </a:solidFill>
+        <a:latin typeface="+mn-lt"/>
+        <a:ea typeface="+mn-ea"/>
+        <a:cs typeface="+mn-cs"/>
+      </a:defRPr>
+    </a:lvl3pPr>
+    <a:lvl4pPr marL="1371600" algn="l" defTabSz="914400" rtl="0" eaLnBrk="1" latinLnBrk="0" hangingPunct="1">
+      <a:defRPr sz="1200" kern="1200">
+        <a:solidFill>
+          <a:schemeClr val="tx1"/>
+        </a:solidFill>
+        <a:latin typeface="+mn-lt"/>
+        <a:ea typeface="+mn-ea"/>
+        <a:cs typeface="+mn-cs"/>
+      </a:defRPr>
+    </a:lvl4pPr>
+    <a:lvl5pPr marL="1828800" algn="l" defTabSz="914400" rtl="0" eaLnBrk="1" latinLnBrk="0" hangingPunct="1">
+      <a:defRPr sz="1200" kern="1200">
+        <a:solidFill>
+          <a:schemeClr val="tx1"/>
+        </a:solidFill>
+        <a:latin typeface="+mn-lt"/>
+        <a:ea typeface="+mn-ea"/>
+        <a:cs typeface="+mn-cs"/>
+      </a:defRPr>
+    </a:lvl5pPr>
+    <a:lvl6pPr marL="2286000" algn="l" defTabSz="914400" rtl="0" eaLnBrk="1" latinLnBrk="0" hangingPunct="1">
+      <a:defRPr sz="1200" kern="1200">
+        <a:solidFill>
+          <a:schemeClr val="tx1"/>
+        </a:solidFill>
+        <a:latin typeface="+mn-lt"/>
+        <a:ea typeface="+mn-ea"/>
+        <a:cs typeface="+mn-cs"/>
+      </a:defRPr>
+    </a:lvl6pPr>
+    <a:lvl7pPr marL="2743200" algn="l" defTabSz="914400" rtl="0" eaLnBrk="1" latinLnBrk="0" hangingPunct="1">
+      <a:defRPr sz="1200" kern="1200">
+        <a:solidFill>
+          <a:schemeClr val="tx1"/>
+        </a:solidFill>
+        <a:latin typeface="+mn-lt"/>
+        <a:ea typeface="+mn-ea"/>
+        <a:cs typeface="+mn-cs"/>
+      </a:defRPr>
+    </a:lvl7pPr>
+    <a:lvl8pPr marL="3200400" algn="l" defTabSz="914400" rtl="0" eaLnBrk="1" latinLnBrk="0" hangingPunct="1">
+      <a:defRPr sz="1200" kern="1200">
+        <a:solidFill>
+          <a:schemeClr val="tx1"/>
+        </a:solidFill>
+        <a:latin typeface="+mn-lt"/>
+        <a:ea typeface="+mn-ea"/>
+        <a:cs typeface="+mn-cs"/>
+      </a:defRPr>
+    </a:lvl8pPr>
+    <a:lvl9pPr marL="3657600" algn="l" defTabSz="914400" rtl="0" eaLnBrk="1" latinLnBrk="0" hangingPunct="1">
+      <a:defRPr sz="1200" kern="1200">
+        <a:solidFill>
+          <a:schemeClr val="tx1"/>
+        </a:solidFill>
+        <a:latin typeface="+mn-lt"/>
+        <a:ea typeface="+mn-ea"/>
+        <a:cs typeface="+mn-cs"/>
+      </a:defRPr>
+    </a:lvl9pPr>
+  </p:notesStyle>
+</p:notesMaster>
+</file>
+
+<file path=ppt/notesSlides/notesSlide1.xml><?xml version="1.0" encoding="utf-8"?>
+<p:notes xmlns:a="http://schemas.openxmlformats.org/drawingml/2006/main" xmlns:r="http://schemas.openxmlformats.org/officeDocument/2006/relationships" xmlns:p="http://schemas.openxmlformats.org/presentationml/2006/main">
+  <p:cSld>
+    <p:spTree>
+      <p:nvGrpSpPr>
+        <p:cNvPr id="1" name=""/>
+        <p:cNvGrpSpPr/>
+        <p:nvPr/>
+      </p:nvGrpSpPr>
+      <p:grpSpPr>
+        <a:xfrm>
+          <a:off x="0" y="0"/>
+          <a:ext cx="0" cy="0"/>
+          <a:chOff x="0" y="0"/>
+          <a:chExt cx="0" cy="0"/>
+        </a:xfrm>
+      </p:grpSpPr>
+      <p:sp>
+        <p:nvSpPr>
+          <p:cNvPr id="2" name="Slide Image Placeholder 1"/>
+          <p:cNvSpPr>
+            <a:spLocks noGrp="1" noRot="1" noChangeAspect="1"/>
+          </p:cNvSpPr>
+          <p:nvPr>
+            <p:ph type="sldImg"/>
+          </p:nvPr>
+        </p:nvSpPr>
+        <p:spPr/>
+      </p:sp>
+      <p:sp>
+        <p:nvSpPr>
+          <p:cNvPr id="3" name="Notes Placeholder 2"/>
+          <p:cNvSpPr>
+            <a:spLocks noGrp="1"/>
+          </p:cNvSpPr>
+          <p:nvPr>
+            <p:ph type="body" idx="1"/>
+          </p:nvPr>
+        </p:nvSpPr>
+        <p:spPr/>
+        <p:txBody>
+          <a:bodyPr/>
+          <a:lstStyle/>
+          <a:p>
+            <a:endParaRPr lang="en-US" dirty="0"/>
+          </a:p>
+        </p:txBody>
+      </p:sp>
+      <p:sp>
+        <p:nvSpPr>
+          <p:cNvPr id="4" name="Slide Number Placeholder 3"/>
+          <p:cNvSpPr>
+            <a:spLocks noGrp="1"/>
+          </p:cNvSpPr>
+          <p:nvPr>
+            <p:ph type="sldNum" sz="quarter" idx="5"/>
+          </p:nvPr>
+        </p:nvSpPr>
+        <p:spPr/>
+        <p:txBody>
+          <a:bodyPr/>
+          <a:lstStyle/>
+          <a:p>
+            <a:fld id="{D86CBE04-A588-EE4F-9F7A-8067FB9DBC1C}" type="slidenum">
+              <a:rPr lang="en-US" smtClean="0"/>
+              <a:t>4</a:t>
+            </a:fld>
+            <a:endParaRPr lang="en-US"/>
+          </a:p>
+        </p:txBody>
+      </p:sp>
+    </p:spTree>
+    <p:extLst>
+      <p:ext uri="{BB962C8B-B14F-4D97-AF65-F5344CB8AC3E}">
+        <p14:creationId xmlns:p14="http://schemas.microsoft.com/office/powerpoint/2010/main" val="3837373540"/>
+      </p:ext>
+    </p:extLst>
+  </p:cSld>
+  <p:clrMapOvr>
+    <a:masterClrMapping/>
+  </p:clrMapOvr>
+</p:notes>
+</file>
+
+<file path=ppt/notesSlides/notesSlide2.xml><?xml version="1.0" encoding="utf-8"?>
+<p:notes xmlns:a="http://schemas.openxmlformats.org/drawingml/2006/main" xmlns:r="http://schemas.openxmlformats.org/officeDocument/2006/relationships" xmlns:p="http://schemas.openxmlformats.org/presentationml/2006/main">
+  <p:cSld>
+    <p:spTree>
+      <p:nvGrpSpPr>
+        <p:cNvPr id="1" name=""/>
+        <p:cNvGrpSpPr/>
+        <p:nvPr/>
+      </p:nvGrpSpPr>
+      <p:grpSpPr>
+        <a:xfrm>
+          <a:off x="0" y="0"/>
+          <a:ext cx="0" cy="0"/>
+          <a:chOff x="0" y="0"/>
+          <a:chExt cx="0" cy="0"/>
+        </a:xfrm>
+      </p:grpSpPr>
+      <p:sp>
+        <p:nvSpPr>
+          <p:cNvPr id="2" name="Slide Image Placeholder 1"/>
+          <p:cNvSpPr>
+            <a:spLocks noGrp="1" noRot="1" noChangeAspect="1"/>
+          </p:cNvSpPr>
+          <p:nvPr>
+            <p:ph type="sldImg"/>
+          </p:nvPr>
+        </p:nvSpPr>
+        <p:spPr/>
+      </p:sp>
+      <p:sp>
+        <p:nvSpPr>
+          <p:cNvPr id="3" name="Notes Placeholder 2"/>
+          <p:cNvSpPr>
+            <a:spLocks noGrp="1"/>
+          </p:cNvSpPr>
+          <p:nvPr>
+            <p:ph type="body" idx="1"/>
+          </p:nvPr>
+        </p:nvSpPr>
+        <p:spPr/>
+        <p:txBody>
+          <a:bodyPr/>
+          <a:lstStyle/>
+          <a:p>
+            <a:endParaRPr lang="en-US" dirty="0"/>
+          </a:p>
+        </p:txBody>
+      </p:sp>
+      <p:sp>
+        <p:nvSpPr>
+          <p:cNvPr id="4" name="Slide Number Placeholder 3"/>
+          <p:cNvSpPr>
+            <a:spLocks noGrp="1"/>
+          </p:cNvSpPr>
+          <p:nvPr>
+            <p:ph type="sldNum" sz="quarter" idx="5"/>
+          </p:nvPr>
+        </p:nvSpPr>
+        <p:spPr/>
+        <p:txBody>
+          <a:bodyPr/>
+          <a:lstStyle/>
+          <a:p>
+            <a:fld id="{D86CBE04-A588-EE4F-9F7A-8067FB9DBC1C}" type="slidenum">
+              <a:rPr lang="en-US" smtClean="0"/>
+              <a:t>5</a:t>
+            </a:fld>
+            <a:endParaRPr lang="en-US"/>
+          </a:p>
+        </p:txBody>
+      </p:sp>
+    </p:spTree>
+    <p:extLst>
+      <p:ext uri="{BB962C8B-B14F-4D97-AF65-F5344CB8AC3E}">
+        <p14:creationId xmlns:p14="http://schemas.microsoft.com/office/powerpoint/2010/main" val="2775563242"/>
+      </p:ext>
+    </p:extLst>
+  </p:cSld>
+  <p:clrMapOvr>
+    <a:masterClrMapping/>
+  </p:clrMapOvr>
+</p:notes>
+</file>
+
 <file path=ppt/slideLayouts/slideLayout1.xml><?xml version="1.0" encoding="utf-8"?>
 <p:sldLayout xmlns:a="http://schemas.openxmlformats.org/drawingml/2006/main" xmlns:r="http://schemas.openxmlformats.org/officeDocument/2006/relationships" xmlns:p="http://schemas.openxmlformats.org/presentationml/2006/main" type="title" preserve="1">
   <p:cSld name="Title Slide">
@@ -312,7 +833,7 @@
           <a:p>
             <a:fld id="{88D38747-4367-4BD2-8D51-C97E202738E2}" type="datetime1">
               <a:rPr lang="en-US" smtClean="0"/>
-              <a:t>12/29/2024</a:t>
+              <a:t>1/2/25</a:t>
             </a:fld>
             <a:endParaRPr lang="en-US" dirty="0"/>
           </a:p>
@@ -617,7 +1138,7 @@
           <a:p>
             <a:fld id="{11F1B079-7EF0-44EE-B798-BCC497C9F3B2}" type="datetime1">
               <a:rPr lang="en-US" smtClean="0"/>
-              <a:t>12/29/2024</a:t>
+              <a:t>1/2/25</a:t>
             </a:fld>
             <a:endParaRPr lang="en-US" dirty="0"/>
           </a:p>
@@ -811,7 +1332,7 @@
           <a:p>
             <a:fld id="{28FF70A8-1D13-4657-95F0-A9EA54967B8D}" type="datetime1">
               <a:rPr lang="en-US" smtClean="0"/>
-              <a:t>12/29/2024</a:t>
+              <a:t>1/2/25</a:t>
             </a:fld>
             <a:endParaRPr lang="en-US" dirty="0"/>
           </a:p>
@@ -1074,7 +1595,7 @@
           <a:p>
             <a:fld id="{21EB90AC-71BD-4C7F-8ACA-7B3F18292E63}" type="datetime1">
               <a:rPr lang="en-US" smtClean="0"/>
-              <a:t>12/29/2024</a:t>
+              <a:t>1/2/25</a:t>
             </a:fld>
             <a:endParaRPr lang="en-US" dirty="0"/>
           </a:p>
@@ -1510,7 +2031,7 @@
           <a:p>
             <a:fld id="{4E6EFC2C-8905-46F0-B443-CE905B76BA01}" type="datetime1">
               <a:rPr lang="en-US" smtClean="0"/>
-              <a:t>12/29/2024</a:t>
+              <a:t>1/2/25</a:t>
             </a:fld>
             <a:endParaRPr lang="en-US" dirty="0"/>
           </a:p>
@@ -2047,7 +2568,7 @@
           <a:p>
             <a:fld id="{D9079DC3-C9B5-499E-9140-0DC28B7074E2}" type="datetime1">
               <a:rPr lang="en-US" smtClean="0"/>
-              <a:t>12/29/2024</a:t>
+              <a:t>1/2/25</a:t>
             </a:fld>
             <a:endParaRPr lang="en-US" dirty="0"/>
           </a:p>
@@ -2929,7 +3450,7 @@
           <a:p>
             <a:fld id="{30BB33EA-E472-4D22-9C03-A9C14AA21CED}" type="datetime1">
               <a:rPr lang="en-US" smtClean="0"/>
-              <a:t>12/29/2024</a:t>
+              <a:t>1/2/25</a:t>
             </a:fld>
             <a:endParaRPr lang="en-US" dirty="0"/>
           </a:p>
@@ -3099,7 +3620,7 @@
           <a:p>
             <a:fld id="{73C55A3C-5767-4844-A0A3-83778C2E5409}" type="datetime1">
               <a:rPr lang="en-US" smtClean="0"/>
-              <a:t>12/29/2024</a:t>
+              <a:t>1/2/25</a:t>
             </a:fld>
             <a:endParaRPr lang="en-US" dirty="0"/>
           </a:p>
@@ -3343,7 +3864,7 @@
           <a:p>
             <a:fld id="{CAE507A8-A5CF-4D38-AB86-7EDDA87A85D4}" type="datetime1">
               <a:rPr lang="en-US" smtClean="0"/>
-              <a:t>12/29/2024</a:t>
+              <a:t>1/2/25</a:t>
             </a:fld>
             <a:endParaRPr lang="en-US" dirty="0"/>
           </a:p>
@@ -3585,7 +4106,7 @@
           <a:p>
             <a:fld id="{BDFCD27C-8599-43EF-BA1D-14DDC1946E06}" type="datetime1">
               <a:rPr lang="en-US" smtClean="0"/>
-              <a:t>12/29/2024</a:t>
+              <a:t>1/2/25</a:t>
             </a:fld>
             <a:endParaRPr lang="en-US" dirty="0"/>
           </a:p>
@@ -4068,7 +4589,7 @@
           <a:p>
             <a:fld id="{49343D99-809A-49C0-96E5-4250D0B498EE}" type="datetime1">
               <a:rPr lang="en-US" smtClean="0"/>
-              <a:t>12/29/2024</a:t>
+              <a:t>1/2/25</a:t>
             </a:fld>
             <a:endParaRPr lang="en-US" dirty="0"/>
           </a:p>
@@ -4186,7 +4707,7 @@
           <a:p>
             <a:fld id="{A143DE9B-B678-4EFB-BB7D-A4370204A0B0}" type="datetime1">
               <a:rPr lang="en-US" smtClean="0"/>
-              <a:t>12/29/2024</a:t>
+              <a:t>1/2/25</a:t>
             </a:fld>
             <a:endParaRPr lang="en-US" dirty="0"/>
           </a:p>
@@ -4281,7 +4802,7 @@
           <a:p>
             <a:fld id="{E68812DA-F765-4142-A6A3-A8ED7235E082}" type="datetime1">
               <a:rPr lang="en-US" smtClean="0"/>
-              <a:t>12/29/2024</a:t>
+              <a:t>1/2/25</a:t>
             </a:fld>
             <a:endParaRPr lang="en-US" dirty="0"/>
           </a:p>
@@ -4536,7 +5057,7 @@
           <a:p>
             <a:fld id="{3E0277FD-7DE6-41D4-930D-AC99F5AFE54E}" type="datetime1">
               <a:rPr lang="en-US" smtClean="0"/>
-              <a:t>12/29/2024</a:t>
+              <a:t>1/2/25</a:t>
             </a:fld>
             <a:endParaRPr lang="en-US" dirty="0"/>
           </a:p>
@@ -4843,7 +5364,7 @@
           <a:p>
             <a:fld id="{9EA15526-7079-4B7B-987C-1B5FAE11A0FF}" type="datetime1">
               <a:rPr lang="en-US" smtClean="0"/>
-              <a:t>12/29/2024</a:t>
+              <a:t>1/2/25</a:t>
             </a:fld>
             <a:endParaRPr lang="en-US" dirty="0"/>
           </a:p>
@@ -5078,7 +5599,7 @@
           <a:p>
             <a:fld id="{073ED0CC-082F-4160-86E5-0D6041F12778}" type="datetime1">
               <a:rPr lang="en-US" smtClean="0"/>
-              <a:t>12/29/2024</a:t>
+              <a:t>1/2/25</a:t>
             </a:fld>
             <a:endParaRPr lang="en-US" dirty="0"/>
           </a:p>
@@ -5993,7 +6514,7 @@
           </a:effectLst>
           <a:extLst>
             <a:ext uri="{91240B29-F687-4f45-9708-019B960494DF}">
-              <a14:hiddenLine xmlns:a16="http://schemas.microsoft.com/office/drawing/2014/main" xmlns:p14="http://schemas.microsoft.com/office/powerpoint/2010/main" xmlns:a14="http://schemas.microsoft.com/office/drawing/2010/main" xmlns="" w="9525">
+              <a14:hiddenLine xmlns="" xmlns:a14="http://schemas.microsoft.com/office/drawing/2010/main" xmlns:p14="http://schemas.microsoft.com/office/powerpoint/2010/main" xmlns:a16="http://schemas.microsoft.com/office/drawing/2014/main" w="9525">
                 <a:solidFill>
                   <a:srgbClr val="000000"/>
                 </a:solidFill>
@@ -6228,6 +6749,66 @@
 </file>
 
 <file path=ppt/slides/slide10.xml><?xml version="1.0" encoding="utf-8"?>
+<p:sld xmlns:a="http://schemas.openxmlformats.org/drawingml/2006/main" xmlns:r="http://schemas.openxmlformats.org/officeDocument/2006/relationships" xmlns:p="http://schemas.openxmlformats.org/presentationml/2006/main">
+  <p:cSld>
+    <p:spTree>
+      <p:nvGrpSpPr>
+        <p:cNvPr id="1" name=""/>
+        <p:cNvGrpSpPr/>
+        <p:nvPr/>
+      </p:nvGrpSpPr>
+      <p:grpSpPr>
+        <a:xfrm>
+          <a:off x="0" y="0"/>
+          <a:ext cx="0" cy="0"/>
+          <a:chOff x="0" y="0"/>
+          <a:chExt cx="0" cy="0"/>
+        </a:xfrm>
+      </p:grpSpPr>
+      <p:pic>
+        <p:nvPicPr>
+          <p:cNvPr id="4" name="Picture 3">
+            <a:extLst>
+              <a:ext uri="{FF2B5EF4-FFF2-40B4-BE49-F238E27FC236}">
+                <a16:creationId xmlns:a16="http://schemas.microsoft.com/office/drawing/2014/main" id="{A11D6A96-A70F-9723-79C0-0D44C3DAD4E5}"/>
+              </a:ext>
+            </a:extLst>
+          </p:cNvPr>
+          <p:cNvPicPr>
+            <a:picLocks noChangeAspect="1"/>
+          </p:cNvPicPr>
+          <p:nvPr/>
+        </p:nvPicPr>
+        <p:blipFill>
+          <a:blip r:embed="rId2"/>
+          <a:stretch>
+            <a:fillRect/>
+          </a:stretch>
+        </p:blipFill>
+        <p:spPr>
+          <a:xfrm>
+            <a:off x="2998908" y="755406"/>
+            <a:ext cx="6194183" cy="5347188"/>
+          </a:xfrm>
+          <a:prstGeom prst="rect">
+            <a:avLst/>
+          </a:prstGeom>
+        </p:spPr>
+      </p:pic>
+    </p:spTree>
+    <p:extLst>
+      <p:ext uri="{BB962C8B-B14F-4D97-AF65-F5344CB8AC3E}">
+        <p14:creationId xmlns:p14="http://schemas.microsoft.com/office/powerpoint/2010/main" val="1027544421"/>
+      </p:ext>
+    </p:extLst>
+  </p:cSld>
+  <p:clrMapOvr>
+    <a:masterClrMapping/>
+  </p:clrMapOvr>
+</p:sld>
+</file>
+
+<file path=ppt/slides/slide11.xml><?xml version="1.0" encoding="utf-8"?>
 <p:sld xmlns:a="http://schemas.openxmlformats.org/drawingml/2006/main" xmlns:r="http://schemas.openxmlformats.org/officeDocument/2006/relationships" xmlns:p="http://schemas.openxmlformats.org/presentationml/2006/main">
   <p:cSld>
     <p:spTree>
@@ -6293,7 +6874,7 @@
 </p:sld>
 </file>
 
-<file path=ppt/slides/slide11.xml><?xml version="1.0" encoding="utf-8"?>
+<file path=ppt/slides/slide12.xml><?xml version="1.0" encoding="utf-8"?>
 <p:sld xmlns:a="http://schemas.openxmlformats.org/drawingml/2006/main" xmlns:r="http://schemas.openxmlformats.org/officeDocument/2006/relationships" xmlns:p="http://schemas.openxmlformats.org/presentationml/2006/main">
   <p:cSld>
     <p:spTree>
@@ -6359,7 +6940,7 @@
 </p:sld>
 </file>
 
-<file path=ppt/slides/slide12.xml><?xml version="1.0" encoding="utf-8"?>
+<file path=ppt/slides/slide13.xml><?xml version="1.0" encoding="utf-8"?>
 <p:sld xmlns:a="http://schemas.openxmlformats.org/drawingml/2006/main" xmlns:r="http://schemas.openxmlformats.org/officeDocument/2006/relationships" xmlns:p="http://schemas.openxmlformats.org/presentationml/2006/main">
   <p:cSld>
     <p:spTree>
@@ -6425,7 +7006,7 @@
 </p:sld>
 </file>
 
-<file path=ppt/slides/slide13.xml><?xml version="1.0" encoding="utf-8"?>
+<file path=ppt/slides/slide14.xml><?xml version="1.0" encoding="utf-8"?>
 <p:sld xmlns:a="http://schemas.openxmlformats.org/drawingml/2006/main" xmlns:r="http://schemas.openxmlformats.org/officeDocument/2006/relationships" xmlns:p="http://schemas.openxmlformats.org/presentationml/2006/main">
   <p:cSld>
     <p:spTree>
@@ -6491,7 +7072,7 @@
 </p:sld>
 </file>
 
-<file path=ppt/slides/slide14.xml><?xml version="1.0" encoding="utf-8"?>
+<file path=ppt/slides/slide15.xml><?xml version="1.0" encoding="utf-8"?>
 <p:sld xmlns:a="http://schemas.openxmlformats.org/drawingml/2006/main" xmlns:r="http://schemas.openxmlformats.org/officeDocument/2006/relationships" xmlns:p="http://schemas.openxmlformats.org/presentationml/2006/main">
   <p:cSld>
     <p:spTree>
@@ -6557,7 +7138,7 @@
 </p:sld>
 </file>
 
-<file path=ppt/slides/slide15.xml><?xml version="1.0" encoding="utf-8"?>
+<file path=ppt/slides/slide16.xml><?xml version="1.0" encoding="utf-8"?>
 <p:sld xmlns:a="http://schemas.openxmlformats.org/drawingml/2006/main" xmlns:r="http://schemas.openxmlformats.org/officeDocument/2006/relationships" xmlns:p="http://schemas.openxmlformats.org/presentationml/2006/main">
   <p:cSld>
     <p:spTree>
@@ -6678,7 +7259,7 @@
 </p:sld>
 </file>
 
-<file path=ppt/slides/slide16.xml><?xml version="1.0" encoding="utf-8"?>
+<file path=ppt/slides/slide17.xml><?xml version="1.0" encoding="utf-8"?>
 <p:sld xmlns:a="http://schemas.openxmlformats.org/drawingml/2006/main" xmlns:r="http://schemas.openxmlformats.org/officeDocument/2006/relationships" xmlns:p="http://schemas.openxmlformats.org/presentationml/2006/main">
   <p:cSld>
     <p:spTree>
@@ -7085,13 +7666,7 @@
   <p:cSld>
     <p:spTree>
       <p:nvGrpSpPr>
-        <p:cNvPr id="1" name="">
-          <a:extLst>
-            <a:ext uri="{FF2B5EF4-FFF2-40B4-BE49-F238E27FC236}">
-              <a16:creationId xmlns:a16="http://schemas.microsoft.com/office/drawing/2014/main" id="{D60678A3-42D1-9BCA-0678-09185B193524}"/>
-            </a:ext>
-          </a:extLst>
-        </p:cNvPr>
+        <p:cNvPr id="1" name=""/>
         <p:cNvGrpSpPr/>
         <p:nvPr/>
       </p:nvGrpSpPr>
@@ -7108,7 +7683,7 @@
           <p:cNvPr id="2" name="Title 1">
             <a:extLst>
               <a:ext uri="{FF2B5EF4-FFF2-40B4-BE49-F238E27FC236}">
-                <a16:creationId xmlns:a16="http://schemas.microsoft.com/office/drawing/2014/main" id="{E1839D2C-B75B-3635-15AF-7ACB4B560D63}"/>
+                <a16:creationId xmlns:a16="http://schemas.microsoft.com/office/drawing/2014/main" id="{4A0F5F7D-49FC-9EBC-A157-31E5353A1514}"/>
               </a:ext>
             </a:extLst>
           </p:cNvPr>
@@ -7116,40 +7691,27 @@
             <a:spLocks noGrp="1"/>
           </p:cNvSpPr>
           <p:nvPr>
-            <p:ph type="ctrTitle"/>
-          </p:nvPr>
-        </p:nvSpPr>
-        <p:spPr>
-          <a:xfrm>
-            <a:off x="1370693" y="0"/>
-            <a:ext cx="9440034" cy="1828801"/>
-          </a:xfrm>
-        </p:spPr>
+            <p:ph type="title"/>
+          </p:nvPr>
+        </p:nvSpPr>
+        <p:spPr/>
         <p:txBody>
           <a:bodyPr/>
           <a:lstStyle/>
           <a:p>
             <a:r>
-              <a:rPr lang="en-US" b="1" dirty="0">
-                <a:effectLst>
-                  <a:outerShdw blurRad="38100" dist="38100" dir="2700000" algn="tl">
-                    <a:srgbClr val="000000">
-                      <a:alpha val="43137"/>
-                    </a:srgbClr>
-                  </a:outerShdw>
-                </a:effectLst>
-              </a:rPr>
-              <a:t>Results</a:t>
-            </a:r>
-          </a:p>
-        </p:txBody>
-      </p:sp>
-      <p:sp>
-        <p:nvSpPr>
-          <p:cNvPr id="3" name="Subtitle 2">
+              <a:rPr lang="en-US" dirty="0"/>
+              <a:t>Dataset Features</a:t>
+            </a:r>
+          </a:p>
+        </p:txBody>
+      </p:sp>
+      <p:sp>
+        <p:nvSpPr>
+          <p:cNvPr id="3" name="Content Placeholder 2">
             <a:extLst>
               <a:ext uri="{FF2B5EF4-FFF2-40B4-BE49-F238E27FC236}">
-                <a16:creationId xmlns:a16="http://schemas.microsoft.com/office/drawing/2014/main" id="{879C9B02-B2F6-82EB-E4BB-8F82D7A779BA}"/>
+                <a16:creationId xmlns:a16="http://schemas.microsoft.com/office/drawing/2014/main" id="{DB267DBA-32D8-8D72-0AC1-9CC29AE20887}"/>
               </a:ext>
             </a:extLst>
           </p:cNvPr>
@@ -7157,47 +7719,583 @@
             <a:spLocks noGrp="1"/>
           </p:cNvSpPr>
           <p:nvPr>
-            <p:ph type="subTitle" idx="1"/>
+            <p:ph idx="1"/>
           </p:nvPr>
         </p:nvSpPr>
         <p:spPr>
           <a:xfrm>
-            <a:off x="1370693" y="2379133"/>
-            <a:ext cx="9440034" cy="2650067"/>
+            <a:off x="913795" y="2076450"/>
+            <a:ext cx="4751281" cy="3714749"/>
           </a:xfrm>
         </p:spPr>
         <p:txBody>
           <a:bodyPr>
+            <a:normAutofit fontScale="62500" lnSpcReduction="20000"/>
+          </a:bodyPr>
+          <a:lstStyle/>
+          <a:p>
+            <a:pPr marL="36900" indent="0">
+              <a:buNone/>
+            </a:pPr>
+            <a:endParaRPr lang="en-US" dirty="0"/>
+          </a:p>
+          <a:p>
+            <a:pPr marL="36900" indent="0">
+              <a:buNone/>
+            </a:pPr>
+            <a:r>
+              <a:rPr lang="en-US" dirty="0"/>
+              <a:t>CODE_GENDER – Applicant Gender</a:t>
+            </a:r>
+          </a:p>
+          <a:p>
+            <a:pPr marL="36900" indent="0">
+              <a:buNone/>
+            </a:pPr>
+            <a:r>
+              <a:rPr lang="en-US" dirty="0"/>
+              <a:t>FLAG_OWN_CAR – Own Car? (Y/N)</a:t>
+            </a:r>
+          </a:p>
+          <a:p>
+            <a:pPr marL="36900" indent="0">
+              <a:buNone/>
+            </a:pPr>
+            <a:r>
+              <a:rPr lang="en-US" dirty="0"/>
+              <a:t>FLAG_OWN_REALTY – Own House? (Y/N)</a:t>
+            </a:r>
+          </a:p>
+          <a:p>
+            <a:pPr marL="36900" indent="0">
+              <a:buNone/>
+            </a:pPr>
+            <a:r>
+              <a:rPr lang="en-US" dirty="0"/>
+              <a:t>CNT_CHILDREN - # of children</a:t>
+            </a:r>
+          </a:p>
+          <a:p>
+            <a:pPr marL="36900" indent="0">
+              <a:buNone/>
+            </a:pPr>
+            <a:r>
+              <a:rPr lang="en-US" dirty="0"/>
+              <a:t>AMT_INCOME_TOTAL – Total Income</a:t>
+            </a:r>
+          </a:p>
+          <a:p>
+            <a:pPr marL="36900" indent="0">
+              <a:buNone/>
+            </a:pPr>
+            <a:r>
+              <a:rPr lang="en-US" dirty="0"/>
+              <a:t>NAME_INCOME_TYPE – Employment Type</a:t>
+            </a:r>
+          </a:p>
+          <a:p>
+            <a:pPr marL="36900" indent="0">
+              <a:buNone/>
+            </a:pPr>
+            <a:r>
+              <a:rPr lang="en-US" dirty="0"/>
+              <a:t>NAME_EDUCATION_TYPE – Education Level</a:t>
+            </a:r>
+          </a:p>
+          <a:p>
+            <a:pPr marL="36900" indent="0">
+              <a:buNone/>
+            </a:pPr>
+            <a:r>
+              <a:rPr lang="en-US" dirty="0"/>
+              <a:t>NAME_FAMILY_STATUS – Single/Married</a:t>
+            </a:r>
+          </a:p>
+          <a:p>
+            <a:pPr marL="36900" indent="0">
+              <a:buNone/>
+            </a:pPr>
+            <a:r>
+              <a:rPr lang="en-US" dirty="0"/>
+              <a:t>NAME_HOUSING_TYPE – House/Apartment</a:t>
+            </a:r>
+          </a:p>
+          <a:p>
+            <a:pPr marL="36900" indent="0">
+              <a:buNone/>
+            </a:pPr>
+            <a:r>
+              <a:rPr lang="en-US" dirty="0"/>
+              <a:t>DAYS_BIRTH – Days since birth</a:t>
+            </a:r>
+          </a:p>
+        </p:txBody>
+      </p:sp>
+      <p:sp>
+        <p:nvSpPr>
+          <p:cNvPr id="8" name="Content Placeholder 2">
+            <a:extLst>
+              <a:ext uri="{FF2B5EF4-FFF2-40B4-BE49-F238E27FC236}">
+                <a16:creationId xmlns:a16="http://schemas.microsoft.com/office/drawing/2014/main" id="{54992BE0-C27D-F064-C166-6A6D475F1F1C}"/>
+              </a:ext>
+            </a:extLst>
+          </p:cNvPr>
+          <p:cNvSpPr txBox="1">
+            <a:spLocks/>
+          </p:cNvSpPr>
+          <p:nvPr/>
+        </p:nvSpPr>
+        <p:spPr>
+          <a:xfrm>
+            <a:off x="6090676" y="2076449"/>
+            <a:ext cx="4751281" cy="3714749"/>
+          </a:xfrm>
+          <a:prstGeom prst="rect">
+            <a:avLst/>
+          </a:prstGeom>
+          <a:effectLst>
+            <a:outerShdw blurRad="25400" dir="17880000">
+              <a:srgbClr val="000000">
+                <a:alpha val="46000"/>
+              </a:srgbClr>
+            </a:outerShdw>
+          </a:effectLst>
+        </p:spPr>
+        <p:txBody>
+          <a:bodyPr vert="horz" lIns="91440" tIns="45720" rIns="91440" bIns="45720" rtlCol="0" anchor="t">
             <a:normAutofit/>
           </a:bodyPr>
-          <a:lstStyle/>
-          <a:p>
-            <a:r>
-              <a:rPr lang="en-US" sz="2400" dirty="0"/>
-              <a:t>Initial request 61%</a:t>
-            </a:r>
-          </a:p>
-          <a:p>
-            <a:r>
-              <a:rPr lang="en-US" sz="2400" dirty="0"/>
-              <a:t>Second run 65%</a:t>
-            </a:r>
-          </a:p>
-          <a:p>
-            <a:r>
-              <a:rPr lang="en-US" sz="2400" dirty="0"/>
-              <a:t>Third run 70%</a:t>
-            </a:r>
-          </a:p>
-          <a:p>
-            <a:endParaRPr lang="en-US" dirty="0"/>
+          <a:lstStyle>
+            <a:lvl1pPr marL="342900" indent="-306000" algn="l" defTabSz="457200" rtl="0" eaLnBrk="1" latinLnBrk="0" hangingPunct="1">
+              <a:lnSpc>
+                <a:spcPct val="110000"/>
+              </a:lnSpc>
+              <a:spcBef>
+                <a:spcPct val="20000"/>
+              </a:spcBef>
+              <a:spcAft>
+                <a:spcPts val="600"/>
+              </a:spcAft>
+              <a:buClr>
+                <a:schemeClr val="tx2"/>
+              </a:buClr>
+              <a:buSzPct val="70000"/>
+              <a:buFont typeface="Wingdings 2" charset="2"/>
+              <a:buChar char=""/>
+              <a:defRPr sz="2300" kern="1200">
+                <a:ln>
+                  <a:solidFill>
+                    <a:schemeClr val="bg1">
+                      <a:lumMod val="75000"/>
+                      <a:lumOff val="25000"/>
+                      <a:alpha val="10000"/>
+                    </a:schemeClr>
+                  </a:solidFill>
+                </a:ln>
+                <a:solidFill>
+                  <a:schemeClr val="tx2"/>
+                </a:solidFill>
+                <a:effectLst>
+                  <a:outerShdw blurRad="9525" dist="25400" dir="14640000" algn="tl" rotWithShape="0">
+                    <a:schemeClr val="bg1">
+                      <a:alpha val="30000"/>
+                    </a:schemeClr>
+                  </a:outerShdw>
+                </a:effectLst>
+                <a:latin typeface="+mn-lt"/>
+                <a:ea typeface="+mn-ea"/>
+                <a:cs typeface="+mn-cs"/>
+              </a:defRPr>
+            </a:lvl1pPr>
+            <a:lvl2pPr marL="720000" indent="-270000" algn="l" defTabSz="457200" rtl="0" eaLnBrk="1" latinLnBrk="0" hangingPunct="1">
+              <a:spcBef>
+                <a:spcPct val="20000"/>
+              </a:spcBef>
+              <a:spcAft>
+                <a:spcPts val="600"/>
+              </a:spcAft>
+              <a:buClr>
+                <a:schemeClr val="tx2"/>
+              </a:buClr>
+              <a:buSzPct val="70000"/>
+              <a:buFont typeface="Wingdings 2" charset="2"/>
+              <a:buChar char=""/>
+              <a:defRPr sz="2100" kern="1200">
+                <a:ln>
+                  <a:solidFill>
+                    <a:schemeClr val="bg1">
+                      <a:lumMod val="75000"/>
+                      <a:lumOff val="25000"/>
+                      <a:alpha val="10000"/>
+                    </a:schemeClr>
+                  </a:solidFill>
+                </a:ln>
+                <a:solidFill>
+                  <a:schemeClr val="tx2"/>
+                </a:solidFill>
+                <a:effectLst>
+                  <a:outerShdw blurRad="9525" dist="25400" dir="14640000" algn="tl" rotWithShape="0">
+                    <a:schemeClr val="bg1">
+                      <a:alpha val="30000"/>
+                    </a:schemeClr>
+                  </a:outerShdw>
+                </a:effectLst>
+                <a:latin typeface="+mn-lt"/>
+                <a:ea typeface="+mn-ea"/>
+                <a:cs typeface="+mn-cs"/>
+              </a:defRPr>
+            </a:lvl2pPr>
+            <a:lvl3pPr marL="1026000" indent="-216000" algn="l" defTabSz="457200" rtl="0" eaLnBrk="1" latinLnBrk="0" hangingPunct="1">
+              <a:spcBef>
+                <a:spcPct val="20000"/>
+              </a:spcBef>
+              <a:spcAft>
+                <a:spcPts val="600"/>
+              </a:spcAft>
+              <a:buClr>
+                <a:schemeClr val="tx2"/>
+              </a:buClr>
+              <a:buSzPct val="70000"/>
+              <a:buFont typeface="Wingdings 2" charset="2"/>
+              <a:buChar char=""/>
+              <a:defRPr sz="1800" kern="1200">
+                <a:ln>
+                  <a:solidFill>
+                    <a:schemeClr val="bg1">
+                      <a:lumMod val="75000"/>
+                      <a:lumOff val="25000"/>
+                      <a:alpha val="10000"/>
+                    </a:schemeClr>
+                  </a:solidFill>
+                </a:ln>
+                <a:solidFill>
+                  <a:schemeClr val="tx2"/>
+                </a:solidFill>
+                <a:effectLst>
+                  <a:outerShdw blurRad="9525" dist="25400" dir="14640000" algn="tl" rotWithShape="0">
+                    <a:schemeClr val="bg1">
+                      <a:alpha val="30000"/>
+                    </a:schemeClr>
+                  </a:outerShdw>
+                </a:effectLst>
+                <a:latin typeface="+mn-lt"/>
+                <a:ea typeface="+mn-ea"/>
+                <a:cs typeface="+mn-cs"/>
+              </a:defRPr>
+            </a:lvl3pPr>
+            <a:lvl4pPr marL="1386000" indent="-216000" algn="l" defTabSz="457200" rtl="0" eaLnBrk="1" latinLnBrk="0" hangingPunct="1">
+              <a:spcBef>
+                <a:spcPct val="20000"/>
+              </a:spcBef>
+              <a:spcAft>
+                <a:spcPts val="600"/>
+              </a:spcAft>
+              <a:buClr>
+                <a:schemeClr val="tx2"/>
+              </a:buClr>
+              <a:buSzPct val="70000"/>
+              <a:buFont typeface="Wingdings 2" charset="2"/>
+              <a:buChar char=""/>
+              <a:defRPr sz="1600" kern="1200">
+                <a:ln>
+                  <a:solidFill>
+                    <a:schemeClr val="bg1">
+                      <a:lumMod val="75000"/>
+                      <a:lumOff val="25000"/>
+                      <a:alpha val="10000"/>
+                    </a:schemeClr>
+                  </a:solidFill>
+                </a:ln>
+                <a:solidFill>
+                  <a:schemeClr val="tx2"/>
+                </a:solidFill>
+                <a:effectLst>
+                  <a:outerShdw blurRad="9525" dist="25400" dir="14640000" algn="tl" rotWithShape="0">
+                    <a:schemeClr val="bg1">
+                      <a:alpha val="30000"/>
+                    </a:schemeClr>
+                  </a:outerShdw>
+                </a:effectLst>
+                <a:latin typeface="+mn-lt"/>
+                <a:ea typeface="+mn-ea"/>
+                <a:cs typeface="+mn-cs"/>
+              </a:defRPr>
+            </a:lvl4pPr>
+            <a:lvl5pPr marL="1674000" indent="-216000" algn="l" defTabSz="457200" rtl="0" eaLnBrk="1" latinLnBrk="0" hangingPunct="1">
+              <a:spcBef>
+                <a:spcPct val="20000"/>
+              </a:spcBef>
+              <a:spcAft>
+                <a:spcPts val="600"/>
+              </a:spcAft>
+              <a:buClr>
+                <a:schemeClr val="tx2"/>
+              </a:buClr>
+              <a:buSzPct val="70000"/>
+              <a:buFont typeface="Wingdings 2" charset="2"/>
+              <a:buChar char=""/>
+              <a:defRPr sz="1600" kern="1200">
+                <a:ln>
+                  <a:solidFill>
+                    <a:schemeClr val="bg1">
+                      <a:lumMod val="75000"/>
+                      <a:lumOff val="25000"/>
+                      <a:alpha val="10000"/>
+                    </a:schemeClr>
+                  </a:solidFill>
+                </a:ln>
+                <a:solidFill>
+                  <a:schemeClr val="tx2"/>
+                </a:solidFill>
+                <a:effectLst>
+                  <a:outerShdw blurRad="9525" dist="25400" dir="14640000" algn="tl" rotWithShape="0">
+                    <a:schemeClr val="bg1">
+                      <a:alpha val="30000"/>
+                    </a:schemeClr>
+                  </a:outerShdw>
+                </a:effectLst>
+                <a:latin typeface="+mn-lt"/>
+                <a:ea typeface="+mn-ea"/>
+                <a:cs typeface="+mn-cs"/>
+              </a:defRPr>
+            </a:lvl5pPr>
+            <a:lvl6pPr marL="2014600" indent="-228600" algn="l" defTabSz="457200" rtl="0" eaLnBrk="1" latinLnBrk="0" hangingPunct="1">
+              <a:spcBef>
+                <a:spcPct val="20000"/>
+              </a:spcBef>
+              <a:spcAft>
+                <a:spcPts val="600"/>
+              </a:spcAft>
+              <a:buClr>
+                <a:schemeClr val="tx2"/>
+              </a:buClr>
+              <a:buSzPct val="70000"/>
+              <a:buFont typeface="Wingdings 2" charset="2"/>
+              <a:buChar char=""/>
+              <a:defRPr sz="1400" kern="1200">
+                <a:ln>
+                  <a:solidFill>
+                    <a:schemeClr val="bg1">
+                      <a:lumMod val="75000"/>
+                      <a:lumOff val="25000"/>
+                      <a:alpha val="10000"/>
+                    </a:schemeClr>
+                  </a:solidFill>
+                </a:ln>
+                <a:solidFill>
+                  <a:schemeClr val="tx2"/>
+                </a:solidFill>
+                <a:effectLst>
+                  <a:outerShdw blurRad="9525" dist="25400" dir="14640000" algn="tl" rotWithShape="0">
+                    <a:schemeClr val="bg1">
+                      <a:alpha val="30000"/>
+                    </a:schemeClr>
+                  </a:outerShdw>
+                </a:effectLst>
+                <a:latin typeface="+mn-lt"/>
+                <a:ea typeface="+mn-ea"/>
+                <a:cs typeface="+mn-cs"/>
+              </a:defRPr>
+            </a:lvl6pPr>
+            <a:lvl7pPr marL="2401800" indent="-228600" algn="l" defTabSz="457200" rtl="0" eaLnBrk="1" latinLnBrk="0" hangingPunct="1">
+              <a:spcBef>
+                <a:spcPct val="20000"/>
+              </a:spcBef>
+              <a:spcAft>
+                <a:spcPts val="600"/>
+              </a:spcAft>
+              <a:buClr>
+                <a:schemeClr val="tx2"/>
+              </a:buClr>
+              <a:buSzPct val="70000"/>
+              <a:buFont typeface="Wingdings 2" charset="2"/>
+              <a:buChar char=""/>
+              <a:defRPr sz="1400" kern="1200">
+                <a:ln>
+                  <a:solidFill>
+                    <a:schemeClr val="bg1">
+                      <a:lumMod val="75000"/>
+                      <a:lumOff val="25000"/>
+                      <a:alpha val="10000"/>
+                    </a:schemeClr>
+                  </a:solidFill>
+                </a:ln>
+                <a:solidFill>
+                  <a:schemeClr val="tx2"/>
+                </a:solidFill>
+                <a:effectLst>
+                  <a:outerShdw blurRad="9525" dist="25400" dir="14640000" algn="tl" rotWithShape="0">
+                    <a:schemeClr val="bg1">
+                      <a:alpha val="30000"/>
+                    </a:schemeClr>
+                  </a:outerShdw>
+                </a:effectLst>
+                <a:latin typeface="+mn-lt"/>
+                <a:ea typeface="+mn-ea"/>
+                <a:cs typeface="+mn-cs"/>
+              </a:defRPr>
+            </a:lvl7pPr>
+            <a:lvl8pPr marL="2789000" indent="-228600" algn="l" defTabSz="457200" rtl="0" eaLnBrk="1" latinLnBrk="0" hangingPunct="1">
+              <a:spcBef>
+                <a:spcPct val="20000"/>
+              </a:spcBef>
+              <a:spcAft>
+                <a:spcPts val="600"/>
+              </a:spcAft>
+              <a:buClr>
+                <a:schemeClr val="tx2"/>
+              </a:buClr>
+              <a:buSzPct val="70000"/>
+              <a:buFont typeface="Wingdings 2" charset="2"/>
+              <a:buChar char=""/>
+              <a:defRPr sz="1400" kern="1200">
+                <a:ln>
+                  <a:solidFill>
+                    <a:schemeClr val="bg1">
+                      <a:lumMod val="75000"/>
+                      <a:lumOff val="25000"/>
+                      <a:alpha val="10000"/>
+                    </a:schemeClr>
+                  </a:solidFill>
+                </a:ln>
+                <a:solidFill>
+                  <a:schemeClr val="tx2"/>
+                </a:solidFill>
+                <a:effectLst>
+                  <a:outerShdw blurRad="9525" dist="25400" dir="14640000" algn="tl" rotWithShape="0">
+                    <a:schemeClr val="bg1">
+                      <a:alpha val="30000"/>
+                    </a:schemeClr>
+                  </a:outerShdw>
+                </a:effectLst>
+                <a:latin typeface="+mn-lt"/>
+                <a:ea typeface="+mn-ea"/>
+                <a:cs typeface="+mn-cs"/>
+              </a:defRPr>
+            </a:lvl8pPr>
+            <a:lvl9pPr marL="3106200" indent="-228600" algn="l" defTabSz="457200" rtl="0" eaLnBrk="1" latinLnBrk="0" hangingPunct="1">
+              <a:spcBef>
+                <a:spcPct val="20000"/>
+              </a:spcBef>
+              <a:spcAft>
+                <a:spcPts val="600"/>
+              </a:spcAft>
+              <a:buClr>
+                <a:schemeClr val="tx2"/>
+              </a:buClr>
+              <a:buSzPct val="70000"/>
+              <a:buFont typeface="Wingdings 2" charset="2"/>
+              <a:buChar char=""/>
+              <a:defRPr sz="1400" kern="1200">
+                <a:ln>
+                  <a:solidFill>
+                    <a:schemeClr val="bg1">
+                      <a:lumMod val="75000"/>
+                      <a:lumOff val="25000"/>
+                      <a:alpha val="10000"/>
+                    </a:schemeClr>
+                  </a:solidFill>
+                </a:ln>
+                <a:solidFill>
+                  <a:schemeClr val="tx2"/>
+                </a:solidFill>
+                <a:effectLst>
+                  <a:outerShdw blurRad="9525" dist="25400" dir="14640000" algn="tl" rotWithShape="0">
+                    <a:schemeClr val="bg1">
+                      <a:alpha val="30000"/>
+                    </a:schemeClr>
+                  </a:outerShdw>
+                </a:effectLst>
+                <a:latin typeface="+mn-lt"/>
+                <a:ea typeface="+mn-ea"/>
+                <a:cs typeface="+mn-cs"/>
+              </a:defRPr>
+            </a:lvl9pPr>
+          </a:lstStyle>
+          <a:p>
+            <a:pPr marL="36900" indent="0">
+              <a:buNone/>
+            </a:pPr>
+            <a:endParaRPr lang="en-US" sz="1400" dirty="0"/>
+          </a:p>
+          <a:p>
+            <a:pPr marL="0" indent="0">
+              <a:buNone/>
+            </a:pPr>
+            <a:r>
+              <a:rPr lang="en-US" sz="1400" dirty="0"/>
+              <a:t>DAYS_EMPLOYED – Length of Employment</a:t>
+            </a:r>
+          </a:p>
+          <a:p>
+            <a:pPr marL="0" indent="0">
+              <a:buNone/>
+            </a:pPr>
+            <a:r>
+              <a:rPr lang="en-US" sz="1400" dirty="0"/>
+              <a:t>FLAG_MOBILE – Own Mobile Phone? (Y/N)</a:t>
+            </a:r>
+          </a:p>
+          <a:p>
+            <a:pPr marL="0" indent="0">
+              <a:buNone/>
+            </a:pPr>
+            <a:r>
+              <a:rPr lang="en-US" sz="1400" dirty="0"/>
+              <a:t>FLAG_WORK_PHONE – Have Work Phone? (Y/N)</a:t>
+            </a:r>
+          </a:p>
+          <a:p>
+            <a:pPr marL="0" indent="0">
+              <a:buNone/>
+            </a:pPr>
+            <a:r>
+              <a:rPr lang="en-US" sz="1400" dirty="0"/>
+              <a:t>FLAG_PHONE – Is There a Phone? (Y/N)</a:t>
+            </a:r>
+          </a:p>
+          <a:p>
+            <a:pPr marL="0" indent="0">
+              <a:buNone/>
+            </a:pPr>
+            <a:r>
+              <a:rPr lang="en-US" sz="1400" dirty="0"/>
+              <a:t>FLAG_EMAIL – Is There an Email? (Y/N)</a:t>
+            </a:r>
+          </a:p>
+          <a:p>
+            <a:pPr marL="0" indent="0">
+              <a:buNone/>
+            </a:pPr>
+            <a:r>
+              <a:rPr lang="en-US" sz="1400" dirty="0"/>
+              <a:t>OCCUPATION_TYPE – Occupation Title</a:t>
+            </a:r>
+          </a:p>
+          <a:p>
+            <a:pPr marL="0" indent="0">
+              <a:buNone/>
+            </a:pPr>
+            <a:r>
+              <a:rPr lang="en-US" sz="1400" dirty="0"/>
+              <a:t>CNT_FAM_MEMBERS – Members in Family</a:t>
+            </a:r>
+          </a:p>
+          <a:p>
+            <a:pPr marL="0" indent="0">
+              <a:buNone/>
+            </a:pPr>
+            <a:r>
+              <a:rPr lang="en-US" sz="1400" dirty="0"/>
+              <a:t>MONTHS_BALANCE – # of Months Carrying Credit</a:t>
+            </a:r>
           </a:p>
         </p:txBody>
       </p:sp>
     </p:spTree>
     <p:extLst>
       <p:ext uri="{BB962C8B-B14F-4D97-AF65-F5344CB8AC3E}">
-        <p14:creationId xmlns:p14="http://schemas.microsoft.com/office/powerpoint/2010/main" val="4121849093"/>
+        <p14:creationId xmlns:p14="http://schemas.microsoft.com/office/powerpoint/2010/main" val="1802771872"/>
       </p:ext>
     </p:extLst>
   </p:cSld>
@@ -7208,6 +8306,168 @@
 </file>
 
 <file path=ppt/slides/slide5.xml><?xml version="1.0" encoding="utf-8"?>
+<p:sld xmlns:a="http://schemas.openxmlformats.org/drawingml/2006/main" xmlns:r="http://schemas.openxmlformats.org/officeDocument/2006/relationships" xmlns:p="http://schemas.openxmlformats.org/presentationml/2006/main">
+  <p:cSld>
+    <p:spTree>
+      <p:nvGrpSpPr>
+        <p:cNvPr id="1" name=""/>
+        <p:cNvGrpSpPr/>
+        <p:nvPr/>
+      </p:nvGrpSpPr>
+      <p:grpSpPr>
+        <a:xfrm>
+          <a:off x="0" y="0"/>
+          <a:ext cx="0" cy="0"/>
+          <a:chOff x="0" y="0"/>
+          <a:chExt cx="0" cy="0"/>
+        </a:xfrm>
+      </p:grpSpPr>
+      <p:sp>
+        <p:nvSpPr>
+          <p:cNvPr id="2" name="Title 1">
+            <a:extLst>
+              <a:ext uri="{FF2B5EF4-FFF2-40B4-BE49-F238E27FC236}">
+                <a16:creationId xmlns:a16="http://schemas.microsoft.com/office/drawing/2014/main" id="{4A0F5F7D-49FC-9EBC-A157-31E5353A1514}"/>
+              </a:ext>
+            </a:extLst>
+          </p:cNvPr>
+          <p:cNvSpPr>
+            <a:spLocks noGrp="1"/>
+          </p:cNvSpPr>
+          <p:nvPr>
+            <p:ph type="title"/>
+          </p:nvPr>
+        </p:nvSpPr>
+        <p:spPr/>
+        <p:txBody>
+          <a:bodyPr/>
+          <a:lstStyle/>
+          <a:p>
+            <a:r>
+              <a:rPr lang="en-US" dirty="0"/>
+              <a:t>Dataset Target</a:t>
+            </a:r>
+          </a:p>
+        </p:txBody>
+      </p:sp>
+      <p:sp>
+        <p:nvSpPr>
+          <p:cNvPr id="5" name="Content Placeholder 4">
+            <a:extLst>
+              <a:ext uri="{FF2B5EF4-FFF2-40B4-BE49-F238E27FC236}">
+                <a16:creationId xmlns:a16="http://schemas.microsoft.com/office/drawing/2014/main" id="{6D047AEF-19B2-5193-BCCB-FE0BA55BBA3A}"/>
+              </a:ext>
+            </a:extLst>
+          </p:cNvPr>
+          <p:cNvSpPr>
+            <a:spLocks noGrp="1"/>
+          </p:cNvSpPr>
+          <p:nvPr>
+            <p:ph idx="1"/>
+          </p:nvPr>
+        </p:nvSpPr>
+        <p:spPr>
+          <a:xfrm>
+            <a:off x="913795" y="2076450"/>
+            <a:ext cx="10710646" cy="4450474"/>
+          </a:xfrm>
+        </p:spPr>
+        <p:txBody>
+          <a:bodyPr>
+            <a:normAutofit/>
+          </a:bodyPr>
+          <a:lstStyle/>
+          <a:p>
+            <a:pPr marL="36900" indent="0">
+              <a:buNone/>
+            </a:pPr>
+            <a:r>
+              <a:rPr lang="en-US" sz="1600" dirty="0"/>
+              <a:t>For our model, we used the STATUS column of our dataset. This column identifies if a user was past due on their debt. </a:t>
+            </a:r>
+          </a:p>
+          <a:p>
+            <a:pPr marL="36900" indent="0">
+              <a:buNone/>
+            </a:pPr>
+            <a:r>
+              <a:rPr lang="en-US" sz="1600" dirty="0"/>
+              <a:t>The breakdown of the STATUS column is as follows:</a:t>
+            </a:r>
+          </a:p>
+          <a:p>
+            <a:r>
+              <a:rPr lang="en-US" sz="1100" dirty="0"/>
+              <a:t>0: 1-29 days past due</a:t>
+            </a:r>
+          </a:p>
+          <a:p>
+            <a:r>
+              <a:rPr lang="en-US" sz="1100" dirty="0"/>
+              <a:t>1: 30-59 days past due</a:t>
+            </a:r>
+          </a:p>
+          <a:p>
+            <a:r>
+              <a:rPr lang="en-US" sz="1100" dirty="0"/>
+              <a:t>2: 60-89 days overdue</a:t>
+            </a:r>
+          </a:p>
+          <a:p>
+            <a:r>
+              <a:rPr lang="en-US" sz="1100" dirty="0"/>
+              <a:t>3: 90-119 days overdue</a:t>
+            </a:r>
+          </a:p>
+          <a:p>
+            <a:r>
+              <a:rPr lang="en-US" sz="1100" dirty="0"/>
+              <a:t>4: 120-149 days overdue</a:t>
+            </a:r>
+          </a:p>
+          <a:p>
+            <a:r>
+              <a:rPr lang="en-US" sz="1100" dirty="0"/>
+              <a:t>5: Overdue or bad debts, write-offs for more than 150 days</a:t>
+            </a:r>
+          </a:p>
+          <a:p>
+            <a:r>
+              <a:rPr lang="en-US" sz="1100" dirty="0"/>
+              <a:t>C: paid off that month</a:t>
+            </a:r>
+          </a:p>
+          <a:p>
+            <a:r>
+              <a:rPr lang="en-US" sz="1100" dirty="0"/>
+              <a:t>X: No loan for the month</a:t>
+            </a:r>
+          </a:p>
+          <a:p>
+            <a:pPr marL="36900" indent="0">
+              <a:buNone/>
+            </a:pPr>
+            <a:r>
+              <a:rPr lang="en-US" sz="1600" dirty="0"/>
+              <a:t>We then mapped out a target column using this column to determine if the applicant was “good” (did not carry debt) or if the applicant was ”bad” (did carry debt).</a:t>
+            </a:r>
+          </a:p>
+        </p:txBody>
+      </p:sp>
+    </p:spTree>
+    <p:extLst>
+      <p:ext uri="{BB962C8B-B14F-4D97-AF65-F5344CB8AC3E}">
+        <p14:creationId xmlns:p14="http://schemas.microsoft.com/office/powerpoint/2010/main" val="2922951257"/>
+      </p:ext>
+    </p:extLst>
+  </p:cSld>
+  <p:clrMapOvr>
+    <a:masterClrMapping/>
+  </p:clrMapOvr>
+</p:sld>
+</file>
+
+<file path=ppt/slides/slide6.xml><?xml version="1.0" encoding="utf-8"?>
 <p:sld xmlns:a="http://schemas.openxmlformats.org/drawingml/2006/main" xmlns:r="http://schemas.openxmlformats.org/officeDocument/2006/relationships" xmlns:p="http://schemas.openxmlformats.org/presentationml/2006/main">
   <p:cSld>
     <p:spTree>
@@ -7289,19 +8549,19 @@
         </p:nvSpPr>
         <p:spPr>
           <a:xfrm>
-            <a:off x="1370693" y="2156883"/>
-            <a:ext cx="9440034" cy="2872317"/>
+            <a:off x="178676" y="2156883"/>
+            <a:ext cx="11708523" cy="2872317"/>
           </a:xfrm>
         </p:spPr>
         <p:txBody>
           <a:bodyPr>
-            <a:normAutofit fontScale="85000" lnSpcReduction="20000"/>
+            <a:normAutofit fontScale="92500" lnSpcReduction="10000"/>
           </a:bodyPr>
           <a:lstStyle/>
           <a:p>
             <a:r>
               <a:rPr lang="en-US" sz="2800" dirty="0"/>
-              <a:t>Overall, we were able to train 5 models during our time constraints. Each iteration attempted to optimized the model in some way in order to increase accuracy.</a:t>
+              <a:t>Overall, we were able to train 5 models during our time constraints. Each iteration attempted to optimized the model in some way to increase accuracy.</a:t>
             </a:r>
           </a:p>
           <a:p>
@@ -7361,7 +8621,7 @@
 </p:sld>
 </file>
 
-<file path=ppt/slides/slide6.xml><?xml version="1.0" encoding="utf-8"?>
+<file path=ppt/slides/slide7.xml><?xml version="1.0" encoding="utf-8"?>
 <p:sld xmlns:a="http://schemas.openxmlformats.org/drawingml/2006/main" xmlns:r="http://schemas.openxmlformats.org/officeDocument/2006/relationships" xmlns:p="http://schemas.openxmlformats.org/presentationml/2006/main">
   <p:cSld>
     <p:spTree>
@@ -7523,7 +8783,7 @@
 </p:sld>
 </file>
 
-<file path=ppt/slides/slide7.xml><?xml version="1.0" encoding="utf-8"?>
+<file path=ppt/slides/slide8.xml><?xml version="1.0" encoding="utf-8"?>
 <p:sld xmlns:a="http://schemas.openxmlformats.org/drawingml/2006/main" xmlns:r="http://schemas.openxmlformats.org/officeDocument/2006/relationships" xmlns:p="http://schemas.openxmlformats.org/presentationml/2006/main">
   <p:cSld>
     <p:spTree>
@@ -7680,7 +8940,7 @@
 </p:sld>
 </file>
 
-<file path=ppt/slides/slide8.xml><?xml version="1.0" encoding="utf-8"?>
+<file path=ppt/slides/slide9.xml><?xml version="1.0" encoding="utf-8"?>
 <p:sld xmlns:a="http://schemas.openxmlformats.org/drawingml/2006/main" xmlns:r="http://schemas.openxmlformats.org/officeDocument/2006/relationships" xmlns:p="http://schemas.openxmlformats.org/presentationml/2006/main">
   <p:cSld>
     <p:spTree>
@@ -7785,66 +9045,6 @@
     <p:extLst>
       <p:ext uri="{BB962C8B-B14F-4D97-AF65-F5344CB8AC3E}">
         <p14:creationId xmlns:p14="http://schemas.microsoft.com/office/powerpoint/2010/main" val="1554341864"/>
-      </p:ext>
-    </p:extLst>
-  </p:cSld>
-  <p:clrMapOvr>
-    <a:masterClrMapping/>
-  </p:clrMapOvr>
-</p:sld>
-</file>
-
-<file path=ppt/slides/slide9.xml><?xml version="1.0" encoding="utf-8"?>
-<p:sld xmlns:a="http://schemas.openxmlformats.org/drawingml/2006/main" xmlns:r="http://schemas.openxmlformats.org/officeDocument/2006/relationships" xmlns:p="http://schemas.openxmlformats.org/presentationml/2006/main">
-  <p:cSld>
-    <p:spTree>
-      <p:nvGrpSpPr>
-        <p:cNvPr id="1" name=""/>
-        <p:cNvGrpSpPr/>
-        <p:nvPr/>
-      </p:nvGrpSpPr>
-      <p:grpSpPr>
-        <a:xfrm>
-          <a:off x="0" y="0"/>
-          <a:ext cx="0" cy="0"/>
-          <a:chOff x="0" y="0"/>
-          <a:chExt cx="0" cy="0"/>
-        </a:xfrm>
-      </p:grpSpPr>
-      <p:pic>
-        <p:nvPicPr>
-          <p:cNvPr id="4" name="Picture 3">
-            <a:extLst>
-              <a:ext uri="{FF2B5EF4-FFF2-40B4-BE49-F238E27FC236}">
-                <a16:creationId xmlns:a16="http://schemas.microsoft.com/office/drawing/2014/main" id="{A11D6A96-A70F-9723-79C0-0D44C3DAD4E5}"/>
-              </a:ext>
-            </a:extLst>
-          </p:cNvPr>
-          <p:cNvPicPr>
-            <a:picLocks noChangeAspect="1"/>
-          </p:cNvPicPr>
-          <p:nvPr/>
-        </p:nvPicPr>
-        <p:blipFill>
-          <a:blip r:embed="rId2"/>
-          <a:stretch>
-            <a:fillRect/>
-          </a:stretch>
-        </p:blipFill>
-        <p:spPr>
-          <a:xfrm>
-            <a:off x="2998908" y="755406"/>
-            <a:ext cx="6194183" cy="5347188"/>
-          </a:xfrm>
-          <a:prstGeom prst="rect">
-            <a:avLst/>
-          </a:prstGeom>
-        </p:spPr>
-      </p:pic>
-    </p:spTree>
-    <p:extLst>
-      <p:ext uri="{BB962C8B-B14F-4D97-AF65-F5344CB8AC3E}">
-        <p14:creationId xmlns:p14="http://schemas.microsoft.com/office/powerpoint/2010/main" val="1027544421"/>
       </p:ext>
     </p:extLst>
   </p:cSld>
@@ -8036,25 +9236,322 @@
 </a:theme>
 </file>
 
-<file path=customXml/item1.xml><?xml version="1.0" encoding="utf-8"?>
-<p:properties xmlns:p="http://schemas.microsoft.com/office/2006/metadata/properties" xmlns:xsi="http://www.w3.org/2001/XMLSchema-instance" xmlns:pc="http://schemas.microsoft.com/office/infopath/2007/PartnerControls">
-  <documentManagement>
-    <Status xmlns="71af3243-3dd4-4a8d-8c0d-dd76da1f02a5">Not started</Status>
-    <MediaServiceKeyPoints xmlns="71af3243-3dd4-4a8d-8c0d-dd76da1f02a5" xsi:nil="true"/>
-  </documentManagement>
-</p:properties>
+<file path=ppt/theme/theme2.xml><?xml version="1.0" encoding="utf-8"?>
+<a:theme xmlns:a="http://schemas.openxmlformats.org/drawingml/2006/main" name="Office Theme">
+  <a:themeElements>
+    <a:clrScheme name="Office">
+      <a:dk1>
+        <a:sysClr val="windowText" lastClr="000000"/>
+      </a:dk1>
+      <a:lt1>
+        <a:sysClr val="window" lastClr="FFFFFF"/>
+      </a:lt1>
+      <a:dk2>
+        <a:srgbClr val="0E2841"/>
+      </a:dk2>
+      <a:lt2>
+        <a:srgbClr val="E8E8E8"/>
+      </a:lt2>
+      <a:accent1>
+        <a:srgbClr val="156082"/>
+      </a:accent1>
+      <a:accent2>
+        <a:srgbClr val="E97132"/>
+      </a:accent2>
+      <a:accent3>
+        <a:srgbClr val="196B24"/>
+      </a:accent3>
+      <a:accent4>
+        <a:srgbClr val="0F9ED5"/>
+      </a:accent4>
+      <a:accent5>
+        <a:srgbClr val="A02B93"/>
+      </a:accent5>
+      <a:accent6>
+        <a:srgbClr val="4EA72E"/>
+      </a:accent6>
+      <a:hlink>
+        <a:srgbClr val="467886"/>
+      </a:hlink>
+      <a:folHlink>
+        <a:srgbClr val="96607D"/>
+      </a:folHlink>
+    </a:clrScheme>
+    <a:fontScheme name="Office">
+      <a:majorFont>
+        <a:latin typeface="Aptos Display" panose="02110004020202020204"/>
+        <a:ea typeface=""/>
+        <a:cs typeface=""/>
+        <a:font script="Jpan" typeface="游ゴシック Light"/>
+        <a:font script="Hang" typeface="맑은 고딕"/>
+        <a:font script="Hans" typeface="等线 Light"/>
+        <a:font script="Hant" typeface="新細明體"/>
+        <a:font script="Arab" typeface="Times New Roman"/>
+        <a:font script="Hebr" typeface="Times New Roman"/>
+        <a:font script="Thai" typeface="Angsana New"/>
+        <a:font script="Ethi" typeface="Nyala"/>
+        <a:font script="Beng" typeface="Vrinda"/>
+        <a:font script="Gujr" typeface="Shruti"/>
+        <a:font script="Khmr" typeface="MoolBoran"/>
+        <a:font script="Knda" typeface="Tunga"/>
+        <a:font script="Guru" typeface="Raavi"/>
+        <a:font script="Cans" typeface="Euphemia"/>
+        <a:font script="Cher" typeface="Plantagenet Cherokee"/>
+        <a:font script="Yiii" typeface="Microsoft Yi Baiti"/>
+        <a:font script="Tibt" typeface="Microsoft Himalaya"/>
+        <a:font script="Thaa" typeface="MV Boli"/>
+        <a:font script="Deva" typeface="Mangal"/>
+        <a:font script="Telu" typeface="Gautami"/>
+        <a:font script="Taml" typeface="Latha"/>
+        <a:font script="Syrc" typeface="Estrangelo Edessa"/>
+        <a:font script="Orya" typeface="Kalinga"/>
+        <a:font script="Mlym" typeface="Kartika"/>
+        <a:font script="Laoo" typeface="DokChampa"/>
+        <a:font script="Sinh" typeface="Iskoola Pota"/>
+        <a:font script="Mong" typeface="Mongolian Baiti"/>
+        <a:font script="Viet" typeface="Times New Roman"/>
+        <a:font script="Uigh" typeface="Microsoft Uighur"/>
+        <a:font script="Geor" typeface="Sylfaen"/>
+        <a:font script="Armn" typeface="Arial"/>
+        <a:font script="Bugi" typeface="Leelawadee UI"/>
+        <a:font script="Bopo" typeface="Microsoft JhengHei"/>
+        <a:font script="Java" typeface="Javanese Text"/>
+        <a:font script="Lisu" typeface="Segoe UI"/>
+        <a:font script="Mymr" typeface="Myanmar Text"/>
+        <a:font script="Nkoo" typeface="Ebrima"/>
+        <a:font script="Olck" typeface="Nirmala UI"/>
+        <a:font script="Osma" typeface="Ebrima"/>
+        <a:font script="Phag" typeface="Phagspa"/>
+        <a:font script="Syrn" typeface="Estrangelo Edessa"/>
+        <a:font script="Syrj" typeface="Estrangelo Edessa"/>
+        <a:font script="Syre" typeface="Estrangelo Edessa"/>
+        <a:font script="Sora" typeface="Nirmala UI"/>
+        <a:font script="Tale" typeface="Microsoft Tai Le"/>
+        <a:font script="Talu" typeface="Microsoft New Tai Lue"/>
+        <a:font script="Tfng" typeface="Ebrima"/>
+      </a:majorFont>
+      <a:minorFont>
+        <a:latin typeface="Aptos" panose="02110004020202020204"/>
+        <a:ea typeface=""/>
+        <a:cs typeface=""/>
+        <a:font script="Jpan" typeface="游ゴシック"/>
+        <a:font script="Hang" typeface="맑은 고딕"/>
+        <a:font script="Hans" typeface="等线"/>
+        <a:font script="Hant" typeface="新細明體"/>
+        <a:font script="Arab" typeface="Arial"/>
+        <a:font script="Hebr" typeface="Arial"/>
+        <a:font script="Thai" typeface="Cordia New"/>
+        <a:font script="Ethi" typeface="Nyala"/>
+        <a:font script="Beng" typeface="Vrinda"/>
+        <a:font script="Gujr" typeface="Shruti"/>
+        <a:font script="Khmr" typeface="DaunPenh"/>
+        <a:font script="Knda" typeface="Tunga"/>
+        <a:font script="Guru" typeface="Raavi"/>
+        <a:font script="Cans" typeface="Euphemia"/>
+        <a:font script="Cher" typeface="Plantagenet Cherokee"/>
+        <a:font script="Yiii" typeface="Microsoft Yi Baiti"/>
+        <a:font script="Tibt" typeface="Microsoft Himalaya"/>
+        <a:font script="Thaa" typeface="MV Boli"/>
+        <a:font script="Deva" typeface="Mangal"/>
+        <a:font script="Telu" typeface="Gautami"/>
+        <a:font script="Taml" typeface="Latha"/>
+        <a:font script="Syrc" typeface="Estrangelo Edessa"/>
+        <a:font script="Orya" typeface="Kalinga"/>
+        <a:font script="Mlym" typeface="Kartika"/>
+        <a:font script="Laoo" typeface="DokChampa"/>
+        <a:font script="Sinh" typeface="Iskoola Pota"/>
+        <a:font script="Mong" typeface="Mongolian Baiti"/>
+        <a:font script="Viet" typeface="Arial"/>
+        <a:font script="Uigh" typeface="Microsoft Uighur"/>
+        <a:font script="Geor" typeface="Sylfaen"/>
+        <a:font script="Armn" typeface="Arial"/>
+        <a:font script="Bugi" typeface="Leelawadee UI"/>
+        <a:font script="Bopo" typeface="Microsoft JhengHei"/>
+        <a:font script="Java" typeface="Javanese Text"/>
+        <a:font script="Lisu" typeface="Segoe UI"/>
+        <a:font script="Mymr" typeface="Myanmar Text"/>
+        <a:font script="Nkoo" typeface="Ebrima"/>
+        <a:font script="Olck" typeface="Nirmala UI"/>
+        <a:font script="Osma" typeface="Ebrima"/>
+        <a:font script="Phag" typeface="Phagspa"/>
+        <a:font script="Syrn" typeface="Estrangelo Edessa"/>
+        <a:font script="Syrj" typeface="Estrangelo Edessa"/>
+        <a:font script="Syre" typeface="Estrangelo Edessa"/>
+        <a:font script="Sora" typeface="Nirmala UI"/>
+        <a:font script="Tale" typeface="Microsoft Tai Le"/>
+        <a:font script="Talu" typeface="Microsoft New Tai Lue"/>
+        <a:font script="Tfng" typeface="Ebrima"/>
+      </a:minorFont>
+    </a:fontScheme>
+    <a:fmtScheme name="Office">
+      <a:fillStyleLst>
+        <a:solidFill>
+          <a:schemeClr val="phClr"/>
+        </a:solidFill>
+        <a:gradFill rotWithShape="1">
+          <a:gsLst>
+            <a:gs pos="0">
+              <a:schemeClr val="phClr">
+                <a:lumMod val="110000"/>
+                <a:satMod val="105000"/>
+                <a:tint val="67000"/>
+              </a:schemeClr>
+            </a:gs>
+            <a:gs pos="50000">
+              <a:schemeClr val="phClr">
+                <a:lumMod val="105000"/>
+                <a:satMod val="103000"/>
+                <a:tint val="73000"/>
+              </a:schemeClr>
+            </a:gs>
+            <a:gs pos="100000">
+              <a:schemeClr val="phClr">
+                <a:lumMod val="105000"/>
+                <a:satMod val="109000"/>
+                <a:tint val="81000"/>
+              </a:schemeClr>
+            </a:gs>
+          </a:gsLst>
+          <a:lin ang="5400000" scaled="0"/>
+        </a:gradFill>
+        <a:gradFill rotWithShape="1">
+          <a:gsLst>
+            <a:gs pos="0">
+              <a:schemeClr val="phClr">
+                <a:satMod val="103000"/>
+                <a:lumMod val="102000"/>
+                <a:tint val="94000"/>
+              </a:schemeClr>
+            </a:gs>
+            <a:gs pos="50000">
+              <a:schemeClr val="phClr">
+                <a:satMod val="110000"/>
+                <a:lumMod val="100000"/>
+                <a:shade val="100000"/>
+              </a:schemeClr>
+            </a:gs>
+            <a:gs pos="100000">
+              <a:schemeClr val="phClr">
+                <a:lumMod val="99000"/>
+                <a:satMod val="120000"/>
+                <a:shade val="78000"/>
+              </a:schemeClr>
+            </a:gs>
+          </a:gsLst>
+          <a:lin ang="5400000" scaled="0"/>
+        </a:gradFill>
+      </a:fillStyleLst>
+      <a:lnStyleLst>
+        <a:ln w="12700" cap="flat" cmpd="sng" algn="ctr">
+          <a:solidFill>
+            <a:schemeClr val="phClr"/>
+          </a:solidFill>
+          <a:prstDash val="solid"/>
+          <a:miter lim="800000"/>
+        </a:ln>
+        <a:ln w="19050" cap="flat" cmpd="sng" algn="ctr">
+          <a:solidFill>
+            <a:schemeClr val="phClr"/>
+          </a:solidFill>
+          <a:prstDash val="solid"/>
+          <a:miter lim="800000"/>
+        </a:ln>
+        <a:ln w="25400" cap="flat" cmpd="sng" algn="ctr">
+          <a:solidFill>
+            <a:schemeClr val="phClr"/>
+          </a:solidFill>
+          <a:prstDash val="solid"/>
+          <a:miter lim="800000"/>
+        </a:ln>
+      </a:lnStyleLst>
+      <a:effectStyleLst>
+        <a:effectStyle>
+          <a:effectLst/>
+        </a:effectStyle>
+        <a:effectStyle>
+          <a:effectLst/>
+        </a:effectStyle>
+        <a:effectStyle>
+          <a:effectLst>
+            <a:outerShdw blurRad="57150" dist="19050" dir="5400000" algn="ctr" rotWithShape="0">
+              <a:srgbClr val="000000">
+                <a:alpha val="63000"/>
+              </a:srgbClr>
+            </a:outerShdw>
+          </a:effectLst>
+        </a:effectStyle>
+      </a:effectStyleLst>
+      <a:bgFillStyleLst>
+        <a:solidFill>
+          <a:schemeClr val="phClr"/>
+        </a:solidFill>
+        <a:solidFill>
+          <a:schemeClr val="phClr">
+            <a:tint val="95000"/>
+            <a:satMod val="170000"/>
+          </a:schemeClr>
+        </a:solidFill>
+        <a:gradFill rotWithShape="1">
+          <a:gsLst>
+            <a:gs pos="0">
+              <a:schemeClr val="phClr">
+                <a:tint val="93000"/>
+                <a:satMod val="150000"/>
+                <a:shade val="98000"/>
+                <a:lumMod val="102000"/>
+              </a:schemeClr>
+            </a:gs>
+            <a:gs pos="50000">
+              <a:schemeClr val="phClr">
+                <a:tint val="98000"/>
+                <a:satMod val="130000"/>
+                <a:shade val="90000"/>
+                <a:lumMod val="103000"/>
+              </a:schemeClr>
+            </a:gs>
+            <a:gs pos="100000">
+              <a:schemeClr val="phClr">
+                <a:shade val="63000"/>
+                <a:satMod val="120000"/>
+              </a:schemeClr>
+            </a:gs>
+          </a:gsLst>
+          <a:lin ang="5400000" scaled="0"/>
+        </a:gradFill>
+      </a:bgFillStyleLst>
+    </a:fmtScheme>
+  </a:themeElements>
+  <a:objectDefaults>
+    <a:lnDef>
+      <a:spPr/>
+      <a:bodyPr/>
+      <a:lstStyle/>
+      <a:style>
+        <a:lnRef idx="2">
+          <a:schemeClr val="accent1"/>
+        </a:lnRef>
+        <a:fillRef idx="0">
+          <a:schemeClr val="accent1"/>
+        </a:fillRef>
+        <a:effectRef idx="1">
+          <a:schemeClr val="accent1"/>
+        </a:effectRef>
+        <a:fontRef idx="minor">
+          <a:schemeClr val="tx1"/>
+        </a:fontRef>
+      </a:style>
+    </a:lnDef>
+  </a:objectDefaults>
+  <a:extraClrSchemeLst/>
+  <a:extLst>
+    <a:ext uri="{05A4C25C-085E-4340-85A3-A5531E510DB2}">
+      <thm15:themeFamily xmlns:thm15="http://schemas.microsoft.com/office/thememl/2012/main" name="Office Theme" id="{2E142A2C-CD16-42D6-873A-C26D2A0506FA}" vid="{1BDDFF52-6CD6-40A5-AB3C-68EB2F1E4D0A}"/>
+    </a:ext>
+  </a:extLst>
+</a:theme>
 </file>
 
-<file path=customXml/item2.xml><?xml version="1.0" encoding="utf-8"?>
-<?mso-contentType ?>
-<FormTemplates xmlns="http://schemas.microsoft.com/sharepoint/v3/contenttype/forms">
-  <Display>DocumentLibraryForm</Display>
-  <Edit>DocumentLibraryForm</Edit>
-  <New>DocumentLibraryForm</New>
-</FormTemplates>
-</file>
-
-<file path=customXml/item3.xml><?xml version="1.0" encoding="utf-8"?>
+<file path=customXml/item1.xml><?xml version="1.0" encoding="utf-8"?>
 <ct:contentTypeSchema xmlns:ct="http://schemas.microsoft.com/office/2006/metadata/contentType" xmlns:ma="http://schemas.microsoft.com/office/2006/metadata/properties/metaAttributes" ct:_="" ma:_="" ma:contentTypeName="Document" ma:contentTypeID="0x01010079F111ED35F8CC479449609E8A0923A6" ma:contentTypeVersion="12" ma:contentTypeDescription="Create a new document." ma:contentTypeScope="" ma:versionID="a410dd7f93c95333ffa1b60ed6adedd1">
   <xsd:schema xmlns:xsd="http://www.w3.org/2001/XMLSchema" xmlns:xs="http://www.w3.org/2001/XMLSchema" xmlns:p="http://schemas.microsoft.com/office/2006/metadata/properties" xmlns:ns2="71af3243-3dd4-4a8d-8c0d-dd76da1f02a5" xmlns:ns3="16c05727-aa75-4e4a-9b5f-8a80a1165891" targetNamespace="http://schemas.microsoft.com/office/2006/metadata/properties" ma:root="true" ma:fieldsID="a936d9baba76aa3866493feff160faab" ns2:_="" ns3:_="">
     <xsd:import namespace="71af3243-3dd4-4a8d-8c0d-dd76da1f02a5"/>
@@ -8275,25 +9772,25 @@
 </ct:contentTypeSchema>
 </file>
 
-<file path=customXml/itemProps1.xml><?xml version="1.0" encoding="utf-8"?>
-<ds:datastoreItem xmlns:ds="http://schemas.openxmlformats.org/officeDocument/2006/customXml" ds:itemID="{F7E70FC5-1855-47AB-8CE1-CB3C873A8988}">
-  <ds:schemaRefs>
-    <ds:schemaRef ds:uri="http://schemas.microsoft.com/office/2006/metadata/properties"/>
-    <ds:schemaRef ds:uri="http://schemas.microsoft.com/office/infopath/2007/PartnerControls"/>
-    <ds:schemaRef ds:uri="71af3243-3dd4-4a8d-8c0d-dd76da1f02a5"/>
-  </ds:schemaRefs>
-</ds:datastoreItem>
+<file path=customXml/item2.xml><?xml version="1.0" encoding="utf-8"?>
+<?mso-contentType ?>
+<FormTemplates xmlns="http://schemas.microsoft.com/sharepoint/v3/contenttype/forms">
+  <Display>DocumentLibraryForm</Display>
+  <Edit>DocumentLibraryForm</Edit>
+  <New>DocumentLibraryForm</New>
+</FormTemplates>
 </file>
 
-<file path=customXml/itemProps2.xml><?xml version="1.0" encoding="utf-8"?>
-<ds:datastoreItem xmlns:ds="http://schemas.openxmlformats.org/officeDocument/2006/customXml" ds:itemID="{30CB38EC-895A-4F8F-8F75-E263501ABB5A}">
-  <ds:schemaRefs>
-    <ds:schemaRef ds:uri="http://schemas.microsoft.com/sharepoint/v3/contenttype/forms"/>
-  </ds:schemaRefs>
-</ds:datastoreItem>
+<file path=customXml/item3.xml><?xml version="1.0" encoding="utf-8"?>
+<p:properties xmlns:p="http://schemas.microsoft.com/office/2006/metadata/properties" xmlns:xsi="http://www.w3.org/2001/XMLSchema-instance" xmlns:pc="http://schemas.microsoft.com/office/infopath/2007/PartnerControls">
+  <documentManagement>
+    <Status xmlns="71af3243-3dd4-4a8d-8c0d-dd76da1f02a5">Not started</Status>
+    <MediaServiceKeyPoints xmlns="71af3243-3dd4-4a8d-8c0d-dd76da1f02a5" xsi:nil="true"/>
+  </documentManagement>
+</p:properties>
 </file>
 
-<file path=customXml/itemProps3.xml><?xml version="1.0" encoding="utf-8"?>
+<file path=customXml/itemProps1.xml><?xml version="1.0" encoding="utf-8"?>
 <ds:datastoreItem xmlns:ds="http://schemas.openxmlformats.org/officeDocument/2006/customXml" ds:itemID="{5560E646-30AD-4BA0-97EA-A7A07DF5499A}">
   <ds:schemaRefs>
     <ds:schemaRef ds:uri="http://schemas.microsoft.com/office/2006/metadata/contentType"/>
@@ -8310,4 +9807,22 @@
     <ds:schemaRef ds:uri="http://schemas.microsoft.com/internal/obd"/>
   </ds:schemaRefs>
 </ds:datastoreItem>
+</file>
+
+<file path=customXml/itemProps2.xml><?xml version="1.0" encoding="utf-8"?>
+<ds:datastoreItem xmlns:ds="http://schemas.openxmlformats.org/officeDocument/2006/customXml" ds:itemID="{30CB38EC-895A-4F8F-8F75-E263501ABB5A}">
+  <ds:schemaRefs>
+    <ds:schemaRef ds:uri="http://schemas.microsoft.com/sharepoint/v3/contenttype/forms"/>
+  </ds:schemaRefs>
+</ds:datastoreItem>
+</file>
+
+<file path=customXml/itemProps3.xml><?xml version="1.0" encoding="utf-8"?>
+<ds:datastoreItem xmlns:ds="http://schemas.openxmlformats.org/officeDocument/2006/customXml" ds:itemID="{F7E70FC5-1855-47AB-8CE1-CB3C873A8988}">
+  <ds:schemaRefs>
+    <ds:schemaRef ds:uri="http://schemas.microsoft.com/office/2006/metadata/properties"/>
+    <ds:schemaRef ds:uri="http://schemas.microsoft.com/office/infopath/2007/PartnerControls"/>
+    <ds:schemaRef ds:uri="71af3243-3dd4-4a8d-8c0d-dd76da1f02a5"/>
+  </ds:schemaRefs>
+</ds:datastoreItem>
 </file>
</xml_diff>